<commit_message>
Added slide with testing triangle.
</commit_message>
<xml_diff>
--- a/content/Entelect - BDD - Dojo - 2017.pptx
+++ b/content/Entelect - BDD - Dojo - 2017.pptx
@@ -5,7 +5,7 @@
     <p:sldMasterId id="2147483660" r:id="rId1"/>
   </p:sldMasterIdLst>
   <p:notesMasterIdLst>
-    <p:notesMasterId r:id="rId20"/>
+    <p:notesMasterId r:id="rId21"/>
   </p:notesMasterIdLst>
   <p:sldIdLst>
     <p:sldId id="256" r:id="rId2"/>
@@ -17,15 +17,16 @@
     <p:sldId id="262" r:id="rId8"/>
     <p:sldId id="263" r:id="rId9"/>
     <p:sldId id="264" r:id="rId10"/>
-    <p:sldId id="265" r:id="rId11"/>
-    <p:sldId id="266" r:id="rId12"/>
-    <p:sldId id="267" r:id="rId13"/>
-    <p:sldId id="268" r:id="rId14"/>
-    <p:sldId id="269" r:id="rId15"/>
-    <p:sldId id="270" r:id="rId16"/>
-    <p:sldId id="271" r:id="rId17"/>
-    <p:sldId id="272" r:id="rId18"/>
-    <p:sldId id="273" r:id="rId19"/>
+    <p:sldId id="274" r:id="rId11"/>
+    <p:sldId id="265" r:id="rId12"/>
+    <p:sldId id="266" r:id="rId13"/>
+    <p:sldId id="267" r:id="rId14"/>
+    <p:sldId id="268" r:id="rId15"/>
+    <p:sldId id="269" r:id="rId16"/>
+    <p:sldId id="270" r:id="rId17"/>
+    <p:sldId id="271" r:id="rId18"/>
+    <p:sldId id="272" r:id="rId19"/>
+    <p:sldId id="273" r:id="rId20"/>
   </p:sldIdLst>
   <p:sldSz cx="9144000" cy="5715000" type="screen16x10"/>
   <p:notesSz cx="6858000" cy="9144000"/>
@@ -231,6 +232,11 @@
       </a:defRPr>
     </a:lvl9pPr>
   </p:defaultTextStyle>
+  <p:extLst>
+    <p:ext uri="{EFAFB233-063F-42B5-8137-9DF3F51BA10A}">
+      <p15:sldGuideLst xmlns:p15="http://schemas.microsoft.com/office/powerpoint/2012/main"/>
+    </p:ext>
+  </p:extLst>
 </p:presentation>
 </file>
 
@@ -1024,7 +1030,7 @@
                 <a:cs typeface="Calibri"/>
                 <a:sym typeface="Calibri"/>
               </a:rPr>
-              <a:t>‹nr.›</a:t>
+              <a:t>‹#›</a:t>
             </a:fld>
             <a:endParaRPr lang="en-ZA" sz="1200" b="0" i="0" u="none" strike="noStrike" cap="none">
               <a:solidFill>
@@ -1252,6 +1258,273 @@
   <p:cSld>
     <p:spTree>
       <p:nvGrpSpPr>
+        <p:cNvPr id="1" name="Shape 146"/>
+        <p:cNvGrpSpPr/>
+        <p:nvPr/>
+      </p:nvGrpSpPr>
+      <p:grpSpPr>
+        <a:xfrm>
+          <a:off x="0" y="0"/>
+          <a:ext cx="0" cy="0"/>
+          <a:chOff x="0" y="0"/>
+          <a:chExt cx="0" cy="0"/>
+        </a:xfrm>
+      </p:grpSpPr>
+      <p:sp>
+        <p:nvSpPr>
+          <p:cNvPr id="147" name="Shape 147"/>
+          <p:cNvSpPr>
+            <a:spLocks noGrp="1" noRot="1" noChangeAspect="1"/>
+          </p:cNvSpPr>
+          <p:nvPr>
+            <p:ph type="sldImg" idx="2"/>
+          </p:nvPr>
+        </p:nvSpPr>
+        <p:spPr>
+          <a:xfrm>
+            <a:off x="685800" y="685800"/>
+            <a:ext cx="5486400" cy="3429000"/>
+          </a:xfrm>
+          <a:custGeom>
+            <a:avLst/>
+            <a:gdLst/>
+            <a:ahLst/>
+            <a:cxnLst/>
+            <a:rect l="0" t="0" r="0" b="0"/>
+            <a:pathLst>
+              <a:path w="120000" h="120000" extrusionOk="0">
+                <a:moveTo>
+                  <a:pt x="0" y="0"/>
+                </a:moveTo>
+                <a:lnTo>
+                  <a:pt x="120000" y="0"/>
+                </a:lnTo>
+                <a:lnTo>
+                  <a:pt x="120000" y="120000"/>
+                </a:lnTo>
+                <a:lnTo>
+                  <a:pt x="0" y="120000"/>
+                </a:lnTo>
+                <a:close/>
+              </a:path>
+            </a:pathLst>
+          </a:custGeom>
+          <a:noFill/>
+          <a:ln w="12700" cap="flat" cmpd="sng">
+            <a:solidFill>
+              <a:srgbClr val="000000"/>
+            </a:solidFill>
+            <a:prstDash val="solid"/>
+            <a:round/>
+            <a:headEnd type="none" w="med" len="med"/>
+            <a:tailEnd type="none" w="med" len="med"/>
+          </a:ln>
+        </p:spPr>
+      </p:sp>
+      <p:sp>
+        <p:nvSpPr>
+          <p:cNvPr id="148" name="Shape 148"/>
+          <p:cNvSpPr txBox="1">
+            <a:spLocks noGrp="1"/>
+          </p:cNvSpPr>
+          <p:nvPr>
+            <p:ph type="body" idx="1"/>
+          </p:nvPr>
+        </p:nvSpPr>
+        <p:spPr>
+          <a:xfrm>
+            <a:off x="685800" y="4343400"/>
+            <a:ext cx="5486399" cy="4114800"/>
+          </a:xfrm>
+          <a:prstGeom prst="rect">
+            <a:avLst/>
+          </a:prstGeom>
+          <a:noFill/>
+          <a:ln>
+            <a:noFill/>
+          </a:ln>
+        </p:spPr>
+        <p:txBody>
+          <a:bodyPr wrap="square" lIns="91425" tIns="45700" rIns="91425" bIns="45700" anchor="t" anchorCtr="0">
+            <a:noAutofit/>
+          </a:bodyPr>
+          <a:lstStyle/>
+          <a:p>
+            <a:pPr marL="0" marR="0" lvl="0" indent="0" algn="l" rtl="0">
+              <a:spcBef>
+                <a:spcPts val="0"/>
+              </a:spcBef>
+              <a:buSzPct val="25000"/>
+              <a:buNone/>
+            </a:pPr>
+            <a:r>
+              <a:rPr lang="en-ZA" sz="1200" b="0" i="0" u="none" strike="noStrike" cap="none">
+                <a:solidFill>
+                  <a:schemeClr val="dk1"/>
+                </a:solidFill>
+                <a:latin typeface="Calibri"/>
+                <a:ea typeface="Calibri"/>
+                <a:cs typeface="Calibri"/>
+                <a:sym typeface="Calibri"/>
+              </a:rPr>
+              <a:t>Note that a broad explanation of the feature being built is included at the top</a:t>
+            </a:r>
+          </a:p>
+          <a:p>
+            <a:pPr marL="0" marR="0" lvl="0" indent="0" algn="l" rtl="0">
+              <a:spcBef>
+                <a:spcPts val="0"/>
+              </a:spcBef>
+              <a:buSzPct val="25000"/>
+              <a:buNone/>
+            </a:pPr>
+            <a:r>
+              <a:rPr lang="en-ZA" sz="1200" b="0" i="0" u="none" strike="noStrike" cap="none">
+                <a:solidFill>
+                  <a:schemeClr val="dk1"/>
+                </a:solidFill>
+                <a:latin typeface="Calibri"/>
+                <a:ea typeface="Calibri"/>
+                <a:cs typeface="Calibri"/>
+                <a:sym typeface="Calibri"/>
+              </a:rPr>
+              <a:t>Your scenario should be concise and be a concrete example with </a:t>
+            </a:r>
+            <a:r>
+              <a:rPr lang="en-ZA" sz="1200" b="1" i="0" u="none" strike="noStrike" cap="none">
+                <a:solidFill>
+                  <a:schemeClr val="dk1"/>
+                </a:solidFill>
+                <a:latin typeface="Calibri"/>
+                <a:ea typeface="Calibri"/>
+                <a:cs typeface="Calibri"/>
+                <a:sym typeface="Calibri"/>
+              </a:rPr>
+              <a:t>real values</a:t>
+            </a:r>
+          </a:p>
+          <a:p>
+            <a:pPr marL="0" marR="0" lvl="0" indent="0" algn="l" rtl="0">
+              <a:spcBef>
+                <a:spcPts val="0"/>
+              </a:spcBef>
+              <a:buSzPct val="25000"/>
+              <a:buNone/>
+            </a:pPr>
+            <a:r>
+              <a:rPr lang="en-ZA" sz="1200" b="0" i="0" u="none" strike="noStrike" cap="none">
+                <a:solidFill>
+                  <a:schemeClr val="dk1"/>
+                </a:solidFill>
+                <a:latin typeface="Calibri"/>
+                <a:ea typeface="Calibri"/>
+                <a:cs typeface="Calibri"/>
+                <a:sym typeface="Calibri"/>
+              </a:rPr>
+              <a:t>Also note that gherkin syntax is almost the same as regular English</a:t>
+            </a:r>
+          </a:p>
+          <a:p>
+            <a:pPr marL="0" marR="0" lvl="0" indent="0" algn="l" rtl="0">
+              <a:spcBef>
+                <a:spcPts val="0"/>
+              </a:spcBef>
+              <a:buSzPct val="25000"/>
+              <a:buNone/>
+            </a:pPr>
+            <a:r>
+              <a:rPr lang="en-ZA" sz="1200" b="0" i="0" u="none" strike="noStrike" cap="none">
+                <a:solidFill>
+                  <a:schemeClr val="dk1"/>
+                </a:solidFill>
+                <a:latin typeface="Calibri"/>
+                <a:ea typeface="Calibri"/>
+                <a:cs typeface="Calibri"/>
+                <a:sym typeface="Calibri"/>
+              </a:rPr>
+              <a:t>The whole feature file forms part of the executable specification of your application</a:t>
+            </a:r>
+          </a:p>
+        </p:txBody>
+      </p:sp>
+      <p:sp>
+        <p:nvSpPr>
+          <p:cNvPr id="149" name="Shape 149"/>
+          <p:cNvSpPr txBox="1">
+            <a:spLocks noGrp="1"/>
+          </p:cNvSpPr>
+          <p:nvPr>
+            <p:ph type="sldNum" idx="12"/>
+          </p:nvPr>
+        </p:nvSpPr>
+        <p:spPr>
+          <a:xfrm>
+            <a:off x="3884612" y="8685213"/>
+            <a:ext cx="2971799" cy="457200"/>
+          </a:xfrm>
+          <a:prstGeom prst="rect">
+            <a:avLst/>
+          </a:prstGeom>
+          <a:noFill/>
+          <a:ln>
+            <a:noFill/>
+          </a:ln>
+        </p:spPr>
+        <p:txBody>
+          <a:bodyPr wrap="square" lIns="91425" tIns="45700" rIns="91425" bIns="45700" anchor="b" anchorCtr="0">
+            <a:noAutofit/>
+          </a:bodyPr>
+          <a:lstStyle/>
+          <a:p>
+            <a:pPr marL="0" marR="0" lvl="0" indent="0" algn="r" rtl="0">
+              <a:spcBef>
+                <a:spcPts val="0"/>
+              </a:spcBef>
+              <a:buSzPct val="25000"/>
+              <a:buNone/>
+            </a:pPr>
+            <a:fld id="{00000000-1234-1234-1234-123412341234}" type="slidenum">
+              <a:rPr lang="en-ZA" sz="1200" b="0" i="0" u="none" strike="noStrike" cap="none">
+                <a:solidFill>
+                  <a:schemeClr val="dk1"/>
+                </a:solidFill>
+                <a:latin typeface="Calibri"/>
+                <a:ea typeface="Calibri"/>
+                <a:cs typeface="Calibri"/>
+                <a:sym typeface="Calibri"/>
+              </a:rPr>
+              <a:t>10</a:t>
+            </a:fld>
+            <a:endParaRPr lang="en-ZA" sz="1200" b="0" i="0" u="none" strike="noStrike" cap="none">
+              <a:solidFill>
+                <a:schemeClr val="dk1"/>
+              </a:solidFill>
+              <a:latin typeface="Calibri"/>
+              <a:ea typeface="Calibri"/>
+              <a:cs typeface="Calibri"/>
+              <a:sym typeface="Calibri"/>
+            </a:endParaRPr>
+          </a:p>
+        </p:txBody>
+      </p:sp>
+    </p:spTree>
+    <p:extLst>
+      <p:ext uri="{BB962C8B-B14F-4D97-AF65-F5344CB8AC3E}">
+        <p14:creationId xmlns:p14="http://schemas.microsoft.com/office/powerpoint/2010/main" val="779762773"/>
+      </p:ext>
+    </p:extLst>
+  </p:cSld>
+  <p:clrMapOvr>
+    <a:masterClrMapping/>
+  </p:clrMapOvr>
+</p:notes>
+</file>
+
+<file path=ppt/notesSlides/notesSlide11.xml><?xml version="1.0" encoding="utf-8"?>
+<p:notes xmlns:a="http://schemas.openxmlformats.org/drawingml/2006/main" xmlns:r="http://schemas.openxmlformats.org/officeDocument/2006/relationships" xmlns:p="http://schemas.openxmlformats.org/presentationml/2006/main" showMasterSp="0" showMasterPhAnim="0">
+  <p:cSld>
+    <p:spTree>
+      <p:nvGrpSpPr>
         <p:cNvPr id="1" name="Shape 153"/>
         <p:cNvGrpSpPr/>
         <p:nvPr/>
@@ -1473,7 +1746,7 @@
 </p:notes>
 </file>
 
-<file path=ppt/notesSlides/notesSlide11.xml><?xml version="1.0" encoding="utf-8"?>
+<file path=ppt/notesSlides/notesSlide12.xml><?xml version="1.0" encoding="utf-8"?>
 <p:notes xmlns:a="http://schemas.openxmlformats.org/drawingml/2006/main" xmlns:r="http://schemas.openxmlformats.org/officeDocument/2006/relationships" xmlns:p="http://schemas.openxmlformats.org/presentationml/2006/main" showMasterSp="0" showMasterPhAnim="0">
   <p:cSld>
     <p:spTree>
@@ -1707,7 +1980,7 @@
 </p:notes>
 </file>
 
-<file path=ppt/notesSlides/notesSlide12.xml><?xml version="1.0" encoding="utf-8"?>
+<file path=ppt/notesSlides/notesSlide13.xml><?xml version="1.0" encoding="utf-8"?>
 <p:notes xmlns:a="http://schemas.openxmlformats.org/drawingml/2006/main" xmlns:r="http://schemas.openxmlformats.org/officeDocument/2006/relationships" xmlns:p="http://schemas.openxmlformats.org/presentationml/2006/main" showMasterSp="0" showMasterPhAnim="0">
   <p:cSld>
     <p:spTree>
@@ -1920,7 +2193,7 @@
 </p:notes>
 </file>
 
-<file path=ppt/notesSlides/notesSlide13.xml><?xml version="1.0" encoding="utf-8"?>
+<file path=ppt/notesSlides/notesSlide14.xml><?xml version="1.0" encoding="utf-8"?>
 <p:notes xmlns:a="http://schemas.openxmlformats.org/drawingml/2006/main" xmlns:r="http://schemas.openxmlformats.org/officeDocument/2006/relationships" xmlns:p="http://schemas.openxmlformats.org/presentationml/2006/main" showMasterSp="0" showMasterPhAnim="0">
   <p:cSld>
     <p:spTree>
@@ -2109,7 +2382,7 @@
 </p:notes>
 </file>
 
-<file path=ppt/notesSlides/notesSlide14.xml><?xml version="1.0" encoding="utf-8"?>
+<file path=ppt/notesSlides/notesSlide15.xml><?xml version="1.0" encoding="utf-8"?>
 <p:notes xmlns:a="http://schemas.openxmlformats.org/drawingml/2006/main" xmlns:r="http://schemas.openxmlformats.org/officeDocument/2006/relationships" xmlns:p="http://schemas.openxmlformats.org/presentationml/2006/main" showMasterSp="0" showMasterPhAnim="0">
   <p:cSld>
     <p:spTree>
@@ -2322,7 +2595,7 @@
 </p:notes>
 </file>
 
-<file path=ppt/notesSlides/notesSlide15.xml><?xml version="1.0" encoding="utf-8"?>
+<file path=ppt/notesSlides/notesSlide16.xml><?xml version="1.0" encoding="utf-8"?>
 <p:notes xmlns:a="http://schemas.openxmlformats.org/drawingml/2006/main" xmlns:r="http://schemas.openxmlformats.org/officeDocument/2006/relationships" xmlns:p="http://schemas.openxmlformats.org/presentationml/2006/main" showMasterSp="0" showMasterPhAnim="0">
   <p:cSld>
     <p:spTree>
@@ -2428,7 +2701,7 @@
 </p:notes>
 </file>
 
-<file path=ppt/notesSlides/notesSlide16.xml><?xml version="1.0" encoding="utf-8"?>
+<file path=ppt/notesSlides/notesSlide17.xml><?xml version="1.0" encoding="utf-8"?>
 <p:notes xmlns:a="http://schemas.openxmlformats.org/drawingml/2006/main" xmlns:r="http://schemas.openxmlformats.org/officeDocument/2006/relationships" xmlns:p="http://schemas.openxmlformats.org/presentationml/2006/main" showMasterSp="0" showMasterPhAnim="0">
   <p:cSld>
     <p:spTree>
@@ -2675,7 +2948,7 @@
 </p:notes>
 </file>
 
-<file path=ppt/notesSlides/notesSlide17.xml><?xml version="1.0" encoding="utf-8"?>
+<file path=ppt/notesSlides/notesSlide18.xml><?xml version="1.0" encoding="utf-8"?>
 <p:notes xmlns:a="http://schemas.openxmlformats.org/drawingml/2006/main" xmlns:r="http://schemas.openxmlformats.org/officeDocument/2006/relationships" xmlns:p="http://schemas.openxmlformats.org/presentationml/2006/main" showMasterSp="0" showMasterPhAnim="0">
   <p:cSld>
     <p:spTree>
@@ -2859,7 +3132,7 @@
 </p:notes>
 </file>
 
-<file path=ppt/notesSlides/notesSlide18.xml><?xml version="1.0" encoding="utf-8"?>
+<file path=ppt/notesSlides/notesSlide19.xml><?xml version="1.0" encoding="utf-8"?>
 <p:notes xmlns:a="http://schemas.openxmlformats.org/drawingml/2006/main" xmlns:r="http://schemas.openxmlformats.org/officeDocument/2006/relationships" xmlns:p="http://schemas.openxmlformats.org/presentationml/2006/main" showMasterSp="0" showMasterPhAnim="0">
   <p:cSld>
     <p:spTree>
@@ -5920,7 +6193,7 @@
                 <a:cs typeface="Calibri"/>
                 <a:sym typeface="Calibri"/>
               </a:rPr>
-              <a:t>‹nr.›</a:t>
+              <a:t>‹#›</a:t>
             </a:fld>
             <a:endParaRPr lang="en-ZA" sz="1800">
               <a:solidFill>
@@ -6658,7 +6931,7 @@
                 <a:cs typeface="Calibri"/>
                 <a:sym typeface="Calibri"/>
               </a:rPr>
-              <a:t>‹nr.›</a:t>
+              <a:t>‹#›</a:t>
             </a:fld>
             <a:endParaRPr lang="en-ZA" sz="1800">
               <a:solidFill>
@@ -7396,7 +7669,7 @@
                 <a:cs typeface="Calibri"/>
                 <a:sym typeface="Calibri"/>
               </a:rPr>
-              <a:t>‹nr.›</a:t>
+              <a:t>‹#›</a:t>
             </a:fld>
             <a:endParaRPr lang="en-ZA" sz="1800">
               <a:solidFill>
@@ -8134,7 +8407,7 @@
                 <a:cs typeface="Arial"/>
                 <a:sym typeface="Arial"/>
               </a:rPr>
-              <a:t>‹nr.›</a:t>
+              <a:t>‹#›</a:t>
             </a:fld>
             <a:endParaRPr lang="en-ZA" sz="1800" b="0" i="0" u="none" strike="noStrike" cap="none">
               <a:solidFill>
@@ -8863,7 +9136,7 @@
                 <a:cs typeface="Calibri"/>
                 <a:sym typeface="Calibri"/>
               </a:rPr>
-              <a:t>‹nr.›</a:t>
+              <a:t>‹#›</a:t>
             </a:fld>
             <a:endParaRPr lang="en-ZA" sz="1800" b="0" i="0" u="none" strike="noStrike" cap="none">
               <a:solidFill>
@@ -9592,7 +9865,7 @@
                 <a:cs typeface="Calibri"/>
                 <a:sym typeface="Calibri"/>
               </a:rPr>
-              <a:t>‹nr.›</a:t>
+              <a:t>‹#›</a:t>
             </a:fld>
             <a:endParaRPr lang="en-ZA" sz="1800">
               <a:solidFill>
@@ -10542,7 +10815,7 @@
                 <a:cs typeface="Calibri"/>
                 <a:sym typeface="Calibri"/>
               </a:rPr>
-              <a:t>‹nr.›</a:t>
+              <a:t>‹#›</a:t>
             </a:fld>
             <a:endParaRPr lang="en-ZA" sz="1800">
               <a:solidFill>
@@ -11898,7 +12171,7 @@
                 <a:cs typeface="Calibri"/>
                 <a:sym typeface="Calibri"/>
               </a:rPr>
-              <a:t>‹nr.›</a:t>
+              <a:t>‹#›</a:t>
             </a:fld>
             <a:endParaRPr lang="en-ZA" sz="1800">
               <a:solidFill>
@@ -12424,7 +12697,7 @@
                 <a:cs typeface="Calibri"/>
                 <a:sym typeface="Calibri"/>
               </a:rPr>
-              <a:t>‹nr.›</a:t>
+              <a:t>‹#›</a:t>
             </a:fld>
             <a:endParaRPr lang="en-ZA" sz="1800">
               <a:solidFill>
@@ -12843,7 +13116,7 @@
                 <a:cs typeface="Calibri"/>
                 <a:sym typeface="Calibri"/>
               </a:rPr>
-              <a:t>‹nr.›</a:t>
+              <a:t>‹#›</a:t>
             </a:fld>
             <a:endParaRPr lang="en-ZA" sz="1800">
               <a:solidFill>
@@ -13784,7 +14057,7 @@
                 <a:cs typeface="Calibri"/>
                 <a:sym typeface="Calibri"/>
               </a:rPr>
-              <a:t>‹nr.›</a:t>
+              <a:t>‹#›</a:t>
             </a:fld>
             <a:endParaRPr lang="en-ZA" sz="1800">
               <a:solidFill>
@@ -14820,7 +15093,7 @@
               <a:buNone/>
             </a:pPr>
             <a:r>
-              <a:rPr lang="en-ZA" sz="1800" dirty="0" smtClean="0">
+              <a:rPr lang="en-ZA" sz="1800" dirty="0">
                 <a:solidFill>
                   <a:srgbClr val="7F7F7F"/>
                 </a:solidFill>
@@ -15001,6 +15274,120 @@
 </file>
 
 <file path=ppt/slides/slide10.xml><?xml version="1.0" encoding="utf-8"?>
+<p:sld xmlns:a="http://schemas.openxmlformats.org/drawingml/2006/main" xmlns:r="http://schemas.openxmlformats.org/officeDocument/2006/relationships" xmlns:p="http://schemas.openxmlformats.org/presentationml/2006/main">
+  <p:cSld>
+    <p:spTree>
+      <p:nvGrpSpPr>
+        <p:cNvPr id="1" name="Shape 150"/>
+        <p:cNvGrpSpPr/>
+        <p:nvPr/>
+      </p:nvGrpSpPr>
+      <p:grpSpPr>
+        <a:xfrm>
+          <a:off x="0" y="0"/>
+          <a:ext cx="0" cy="0"/>
+          <a:chOff x="0" y="0"/>
+          <a:chExt cx="0" cy="0"/>
+        </a:xfrm>
+      </p:grpSpPr>
+      <p:sp>
+        <p:nvSpPr>
+          <p:cNvPr id="151" name="Shape 151"/>
+          <p:cNvSpPr txBox="1">
+            <a:spLocks noGrp="1"/>
+          </p:cNvSpPr>
+          <p:nvPr>
+            <p:ph type="title"/>
+          </p:nvPr>
+        </p:nvSpPr>
+        <p:spPr>
+          <a:xfrm>
+            <a:off x="457200" y="228863"/>
+            <a:ext cx="8229600" cy="588409"/>
+          </a:xfrm>
+          <a:prstGeom prst="rect">
+            <a:avLst/>
+          </a:prstGeom>
+          <a:noFill/>
+          <a:ln>
+            <a:noFill/>
+          </a:ln>
+        </p:spPr>
+        <p:txBody>
+          <a:bodyPr wrap="square" lIns="91425" tIns="45700" rIns="91425" bIns="45700" anchor="ctr" anchorCtr="0">
+            <a:noAutofit/>
+          </a:bodyPr>
+          <a:lstStyle/>
+          <a:p>
+            <a:pPr>
+              <a:buSzPct val="25000"/>
+            </a:pPr>
+            <a:r>
+              <a:rPr lang="en-ZA" sz="2850"/>
+              <a:t>The Testing Triangle</a:t>
+            </a:r>
+            <a:br>
+              <a:rPr lang="en-ZA" sz="2850" b="1" i="0" u="none" strike="noStrike" cap="none" dirty="0">
+                <a:solidFill>
+                  <a:srgbClr val="002850"/>
+                </a:solidFill>
+                <a:latin typeface="Arial"/>
+                <a:ea typeface="Arial"/>
+                <a:cs typeface="Arial"/>
+              </a:rPr>
+            </a:br>
+            <a:endParaRPr lang="en-ZA" sz="1950">
+              <a:solidFill>
+                <a:srgbClr val="3E81D1"/>
+              </a:solidFill>
+            </a:endParaRPr>
+          </a:p>
+        </p:txBody>
+      </p:sp>
+      <p:pic>
+        <p:nvPicPr>
+          <p:cNvPr id="10" name="Picture 10">
+            <a:extLst>
+              <a:ext uri="{FF2B5EF4-FFF2-40B4-BE49-F238E27FC236}">
+                <a16:creationId xmlns:a16="http://schemas.microsoft.com/office/drawing/2014/main" id="{D535AF4A-C799-48DE-8BD2-BC260C9971D8}"/>
+              </a:ext>
+            </a:extLst>
+          </p:cNvPr>
+          <p:cNvPicPr>
+            <a:picLocks noChangeAspect="1"/>
+          </p:cNvPicPr>
+          <p:nvPr/>
+        </p:nvPicPr>
+        <p:blipFill>
+          <a:blip r:embed="rId3"/>
+          <a:stretch>
+            <a:fillRect/>
+          </a:stretch>
+        </p:blipFill>
+        <p:spPr>
+          <a:xfrm>
+            <a:off x="1052750" y="776112"/>
+            <a:ext cx="6424935" cy="4069366"/>
+          </a:xfrm>
+          <a:prstGeom prst="rect">
+            <a:avLst/>
+          </a:prstGeom>
+        </p:spPr>
+      </p:pic>
+    </p:spTree>
+    <p:extLst>
+      <p:ext uri="{BB962C8B-B14F-4D97-AF65-F5344CB8AC3E}">
+        <p14:creationId xmlns:p14="http://schemas.microsoft.com/office/powerpoint/2010/main" val="4196265950"/>
+      </p:ext>
+    </p:extLst>
+  </p:cSld>
+  <p:clrMapOvr>
+    <a:masterClrMapping/>
+  </p:clrMapOvr>
+</p:sld>
+</file>
+
+<file path=ppt/slides/slide11.xml><?xml version="1.0" encoding="utf-8"?>
 <p:sld xmlns:a="http://schemas.openxmlformats.org/drawingml/2006/main" xmlns:r="http://schemas.openxmlformats.org/officeDocument/2006/relationships" xmlns:p="http://schemas.openxmlformats.org/presentationml/2006/main">
   <p:cSld>
     <p:spTree>
@@ -15256,7 +15643,7 @@
 </p:sld>
 </file>
 
-<file path=ppt/slides/slide11.xml><?xml version="1.0" encoding="utf-8"?>
+<file path=ppt/slides/slide12.xml><?xml version="1.0" encoding="utf-8"?>
 <p:sld xmlns:a="http://schemas.openxmlformats.org/drawingml/2006/main" xmlns:r="http://schemas.openxmlformats.org/officeDocument/2006/relationships" xmlns:p="http://schemas.openxmlformats.org/presentationml/2006/main">
   <p:cSld>
     <p:spTree>
@@ -15386,7 +15773,7 @@
 </p:sld>
 </file>
 
-<file path=ppt/slides/slide12.xml><?xml version="1.0" encoding="utf-8"?>
+<file path=ppt/slides/slide13.xml><?xml version="1.0" encoding="utf-8"?>
 <p:sld xmlns:a="http://schemas.openxmlformats.org/drawingml/2006/main" xmlns:r="http://schemas.openxmlformats.org/officeDocument/2006/relationships" xmlns:p="http://schemas.openxmlformats.org/presentationml/2006/main">
   <p:cSld>
     <p:spTree>
@@ -15622,7 +16009,7 @@
 </p:sld>
 </file>
 
-<file path=ppt/slides/slide13.xml><?xml version="1.0" encoding="utf-8"?>
+<file path=ppt/slides/slide14.xml><?xml version="1.0" encoding="utf-8"?>
 <p:sld xmlns:a="http://schemas.openxmlformats.org/drawingml/2006/main" xmlns:r="http://schemas.openxmlformats.org/officeDocument/2006/relationships" xmlns:p="http://schemas.openxmlformats.org/presentationml/2006/main">
   <p:cSld>
     <p:spTree>
@@ -15889,7 +16276,7 @@
 </p:sld>
 </file>
 
-<file path=ppt/slides/slide14.xml><?xml version="1.0" encoding="utf-8"?>
+<file path=ppt/slides/slide15.xml><?xml version="1.0" encoding="utf-8"?>
 <p:sld xmlns:a="http://schemas.openxmlformats.org/drawingml/2006/main" xmlns:r="http://schemas.openxmlformats.org/officeDocument/2006/relationships" xmlns:p="http://schemas.openxmlformats.org/presentationml/2006/main">
   <p:cSld>
     <p:spTree>
@@ -16014,55 +16401,7 @@
                 <a:cs typeface="Arial"/>
                 <a:sym typeface="Arial"/>
               </a:rPr>
-              <a:t>The product owner has requested new functionality to be added that caters </a:t>
-            </a:r>
-            <a:r>
-              <a:rPr lang="en-ZA" sz="2220" b="0" i="0" u="none" strike="noStrike" cap="none" dirty="0" smtClean="0">
-                <a:solidFill>
-                  <a:srgbClr val="002850"/>
-                </a:solidFill>
-                <a:latin typeface="Arial"/>
-                <a:ea typeface="Arial"/>
-                <a:cs typeface="Arial"/>
-                <a:sym typeface="Arial"/>
-              </a:rPr>
-              <a:t>for a “two for the price of one” </a:t>
-            </a:r>
-            <a:r>
-              <a:rPr lang="en-ZA" sz="2220" b="0" i="0" u="none" strike="noStrike" cap="none" dirty="0">
-                <a:solidFill>
-                  <a:srgbClr val="002850"/>
-                </a:solidFill>
-                <a:latin typeface="Arial"/>
-                <a:ea typeface="Arial"/>
-                <a:cs typeface="Arial"/>
-                <a:sym typeface="Arial"/>
-              </a:rPr>
-              <a:t>special </a:t>
-            </a:r>
-            <a:r>
-              <a:rPr lang="en-ZA" sz="2220" b="0" i="0" u="none" strike="noStrike" cap="none" dirty="0" smtClean="0">
-                <a:solidFill>
-                  <a:srgbClr val="002850"/>
-                </a:solidFill>
-                <a:latin typeface="Arial"/>
-                <a:ea typeface="Arial"/>
-                <a:cs typeface="Arial"/>
-                <a:sym typeface="Arial"/>
-              </a:rPr>
-              <a:t>offer </a:t>
-            </a:r>
-            <a:r>
-              <a:rPr lang="en-ZA" sz="2220" b="0" i="0" u="none" strike="noStrike" cap="none" dirty="0">
-                <a:solidFill>
-                  <a:srgbClr val="002850"/>
-                </a:solidFill>
-                <a:latin typeface="Arial"/>
-                <a:ea typeface="Arial"/>
-                <a:cs typeface="Arial"/>
-                <a:sym typeface="Arial"/>
-              </a:rPr>
-              <a:t>on all chocolate bars during the month of September. The bar price</a:t>
+              <a:t>The product owner has requested new functionality to be added that caters for a “two for the price of one” special offer on all chocolate bars during the month of September. The bar price</a:t>
             </a:r>
             <a:r>
               <a:rPr lang="en-ZA" sz="2220" dirty="0"/>
@@ -16370,7 +16709,7 @@
 </p:sld>
 </file>
 
-<file path=ppt/slides/slide15.xml><?xml version="1.0" encoding="utf-8"?>
+<file path=ppt/slides/slide16.xml><?xml version="1.0" encoding="utf-8"?>
 <p:sld xmlns:a="http://schemas.openxmlformats.org/drawingml/2006/main" xmlns:r="http://schemas.openxmlformats.org/officeDocument/2006/relationships" xmlns:p="http://schemas.openxmlformats.org/presentationml/2006/main">
   <p:cSld>
     <p:spTree>
@@ -16584,7 +16923,7 @@
 </p:sld>
 </file>
 
-<file path=ppt/slides/slide16.xml><?xml version="1.0" encoding="utf-8"?>
+<file path=ppt/slides/slide17.xml><?xml version="1.0" encoding="utf-8"?>
 <p:sld xmlns:a="http://schemas.openxmlformats.org/drawingml/2006/main" xmlns:r="http://schemas.openxmlformats.org/officeDocument/2006/relationships" xmlns:p="http://schemas.openxmlformats.org/presentationml/2006/main">
   <p:cSld>
     <p:spTree>
@@ -16718,7 +17057,7 @@
 </p:sld>
 </file>
 
-<file path=ppt/slides/slide17.xml><?xml version="1.0" encoding="utf-8"?>
+<file path=ppt/slides/slide18.xml><?xml version="1.0" encoding="utf-8"?>
 <p:sld xmlns:a="http://schemas.openxmlformats.org/drawingml/2006/main" xmlns:r="http://schemas.openxmlformats.org/officeDocument/2006/relationships" xmlns:p="http://schemas.openxmlformats.org/presentationml/2006/main">
   <p:cSld>
     <p:spTree>
@@ -16938,7 +17277,7 @@
 </p:sld>
 </file>
 
-<file path=ppt/slides/slide18.xml><?xml version="1.0" encoding="utf-8"?>
+<file path=ppt/slides/slide19.xml><?xml version="1.0" encoding="utf-8"?>
 <p:sld xmlns:a="http://schemas.openxmlformats.org/drawingml/2006/main" xmlns:r="http://schemas.openxmlformats.org/officeDocument/2006/relationships" xmlns:p="http://schemas.openxmlformats.org/presentationml/2006/main">
   <p:cSld>
     <p:spTree>

</xml_diff>